<commit_message>
updated partners and funders logos
</commit_message>
<xml_diff>
--- a/IDCC2015_Data_Carpentry.pptx
+++ b/IDCC2015_Data_Carpentry.pptx
@@ -3291,8 +3291,8 @@
         </p:nvSpPr>
         <p:spPr>
           <a:xfrm>
-            <a:off x="127000" y="2714625"/>
-            <a:ext cx="8978900" cy="1470025"/>
+            <a:off x="0" y="2496494"/>
+            <a:ext cx="9105900" cy="1470025"/>
           </a:xfrm>
         </p:spPr>
         <p:txBody>
@@ -3302,7 +3302,7 @@
           <a:lstStyle/>
           <a:p>
             <a:r>
-              <a:rPr lang="en-US" dirty="0" smtClean="0">
+              <a:rPr lang="en-US" b="1" dirty="0" smtClean="0">
                 <a:solidFill>
                   <a:schemeClr val="tx1">
                     <a:lumMod val="75000"/>
@@ -3312,7 +3312,7 @@
               </a:rPr>
               <a:t>Data Carpentry: workshops to increase data literacy for researchers</a:t>
             </a:r>
-            <a:endParaRPr lang="en-US" dirty="0">
+            <a:endParaRPr lang="en-US" b="1" dirty="0">
               <a:solidFill>
                 <a:schemeClr val="tx1">
                   <a:lumMod val="75000"/>
@@ -3335,13 +3335,13 @@
         </p:nvSpPr>
         <p:spPr>
           <a:xfrm>
-            <a:off x="889000" y="4552950"/>
+            <a:off x="1219200" y="4184650"/>
             <a:ext cx="7404100" cy="2260600"/>
           </a:xfrm>
         </p:spPr>
         <p:txBody>
           <a:bodyPr>
-            <a:normAutofit/>
+            <a:normAutofit fontScale="92500" lnSpcReduction="10000"/>
           </a:bodyPr>
           <a:lstStyle/>
           <a:p>
@@ -3391,8 +3391,18 @@
             </a:r>
           </a:p>
           <a:p>
-            <a:r>
-              <a:rPr lang="en-US" sz="2400" dirty="0" smtClean="0">
+            <a:endParaRPr lang="en-US" sz="2400" i="1" dirty="0" smtClean="0">
+              <a:solidFill>
+                <a:schemeClr val="tx1">
+                  <a:lumMod val="65000"/>
+                  <a:lumOff val="35000"/>
+                </a:schemeClr>
+              </a:solidFill>
+            </a:endParaRPr>
+          </a:p>
+          <a:p>
+            <a:r>
+              <a:rPr lang="en-US" sz="2400" i="1" dirty="0" smtClean="0">
                 <a:solidFill>
                   <a:schemeClr val="tx1">
                     <a:lumMod val="65000"/>
@@ -3400,10 +3410,21 @@
                   </a:schemeClr>
                 </a:solidFill>
               </a:rPr>
-              <a:t>International Digital </a:t>
-            </a:r>
-            <a:r>
-              <a:rPr lang="en-US" sz="2400" dirty="0" err="1" smtClean="0">
+              <a:t>International </a:t>
+            </a:r>
+            <a:r>
+              <a:rPr lang="en-US" sz="2400" i="1" dirty="0" smtClean="0">
+                <a:solidFill>
+                  <a:schemeClr val="tx1">
+                    <a:lumMod val="65000"/>
+                    <a:lumOff val="35000"/>
+                  </a:schemeClr>
+                </a:solidFill>
+              </a:rPr>
+              <a:t>Digital </a:t>
+            </a:r>
+            <a:r>
+              <a:rPr lang="en-US" sz="2400" i="1" dirty="0" err="1" smtClean="0">
                 <a:solidFill>
                   <a:schemeClr val="tx1">
                     <a:lumMod val="65000"/>
@@ -3414,7 +3435,7 @@
               <a:t>Curation</a:t>
             </a:r>
             <a:r>
-              <a:rPr lang="en-US" sz="2400" dirty="0" smtClean="0">
+              <a:rPr lang="en-US" sz="2400" i="1" dirty="0" smtClean="0">
                 <a:solidFill>
                   <a:schemeClr val="tx1">
                     <a:lumMod val="65000"/>
@@ -3425,7 +3446,7 @@
               <a:t> </a:t>
             </a:r>
             <a:r>
-              <a:rPr lang="en-US" sz="2400" dirty="0" smtClean="0">
+              <a:rPr lang="en-US" sz="2400" i="1" dirty="0" smtClean="0">
                 <a:solidFill>
                   <a:schemeClr val="tx1">
                     <a:lumMod val="65000"/>
@@ -3438,7 +3459,7 @@
           </a:p>
           <a:p>
             <a:r>
-              <a:rPr lang="en-US" sz="2400" dirty="0" smtClean="0">
+              <a:rPr lang="en-US" sz="2400" i="1" dirty="0" smtClean="0">
                 <a:solidFill>
                   <a:schemeClr val="tx1">
                     <a:lumMod val="65000"/>
@@ -3451,7 +3472,7 @@
           </a:p>
           <a:p>
             <a:r>
-              <a:rPr lang="en-US" sz="2400" dirty="0" smtClean="0">
+              <a:rPr lang="en-US" sz="2400" i="1" dirty="0" smtClean="0">
                 <a:solidFill>
                   <a:schemeClr val="tx1">
                     <a:lumMod val="65000"/>
@@ -3462,7 +3483,7 @@
               <a:t>10</a:t>
             </a:r>
             <a:r>
-              <a:rPr lang="en-US" sz="2400" baseline="30000" dirty="0" smtClean="0">
+              <a:rPr lang="en-US" sz="2400" i="1" baseline="30000" dirty="0" smtClean="0">
                 <a:solidFill>
                   <a:schemeClr val="tx1">
                     <a:lumMod val="65000"/>
@@ -3473,7 +3494,7 @@
               <a:t>th</a:t>
             </a:r>
             <a:r>
-              <a:rPr lang="en-US" sz="2400" dirty="0" smtClean="0">
+              <a:rPr lang="en-US" sz="2400" i="1" dirty="0" smtClean="0">
                 <a:solidFill>
                   <a:schemeClr val="tx1">
                     <a:lumMod val="65000"/>
@@ -3515,7 +3536,7 @@
         </p:blipFill>
         <p:spPr>
           <a:xfrm>
-            <a:off x="2924724" y="-317500"/>
+            <a:off x="2924724" y="-469900"/>
             <a:ext cx="3653875" cy="3652050"/>
           </a:xfrm>
         </p:spPr>
@@ -3536,7 +3557,7 @@
         </p:blipFill>
         <p:spPr>
           <a:xfrm>
-            <a:off x="63501" y="4337051"/>
+            <a:off x="63501" y="6125269"/>
             <a:ext cx="2133600" cy="551062"/>
           </a:xfrm>
           <a:prstGeom prst="rect">
@@ -3566,7 +3587,7 @@
         </p:blipFill>
         <p:spPr>
           <a:xfrm>
-            <a:off x="7804326" y="4068119"/>
+            <a:off x="7626526" y="5762182"/>
             <a:ext cx="1301574" cy="969661"/>
           </a:xfrm>
           <a:prstGeom prst="rect">
@@ -3900,8 +3921,8 @@
         </p:nvSpPr>
         <p:spPr>
           <a:xfrm>
-            <a:off x="495300" y="2267634"/>
-            <a:ext cx="4392613" cy="369332"/>
+            <a:off x="701676" y="2267634"/>
+            <a:ext cx="2552700" cy="646331"/>
           </a:xfrm>
           <a:prstGeom prst="rect">
             <a:avLst/>
@@ -4024,32 +4045,49 @@
         </p:nvSpPr>
         <p:spPr>
           <a:xfrm>
-            <a:off x="4728421" y="2267634"/>
-            <a:ext cx="4455066" cy="584776"/>
+            <a:off x="3746500" y="2267634"/>
+            <a:ext cx="5436987" cy="707886"/>
           </a:xfrm>
           <a:prstGeom prst="rect">
             <a:avLst/>
           </a:prstGeom>
         </p:spPr>
         <p:txBody>
-          <a:bodyPr wrap="none">
+          <a:bodyPr wrap="square">
             <a:spAutoFit/>
           </a:bodyPr>
           <a:lstStyle/>
           <a:p>
             <a:r>
-              <a:rPr lang="en-US" sz="3200" dirty="0" smtClean="0"/>
+              <a:rPr lang="en-US" sz="4000" b="1" dirty="0" smtClean="0">
+                <a:solidFill>
+                  <a:schemeClr val="tx1">
+                    <a:lumMod val="75000"/>
+                    <a:lumOff val="25000"/>
+                  </a:schemeClr>
+                </a:solidFill>
+              </a:rPr>
               <a:t>http://</a:t>
             </a:r>
             <a:r>
-              <a:rPr lang="en-US" sz="3200" dirty="0" err="1" smtClean="0"/>
+              <a:rPr lang="en-US" sz="4000" b="1" dirty="0" err="1" smtClean="0">
+                <a:solidFill>
+                  <a:schemeClr val="tx1">
+                    <a:lumMod val="75000"/>
+                    <a:lumOff val="25000"/>
+                  </a:schemeClr>
+                </a:solidFill>
+              </a:rPr>
               <a:t>datacarpentry.org</a:t>
             </a:r>
-            <a:r>
-              <a:rPr lang="en-US" sz="3200" dirty="0" smtClean="0"/>
-              <a:t>/</a:t>
-            </a:r>
-            <a:endParaRPr lang="en-US" sz="3200" dirty="0"/>
+            <a:endParaRPr lang="en-US" sz="4000" b="1" dirty="0">
+              <a:solidFill>
+                <a:schemeClr val="tx1">
+                  <a:lumMod val="75000"/>
+                  <a:lumOff val="25000"/>
+                </a:schemeClr>
+              </a:solidFill>
+            </a:endParaRPr>
           </a:p>
         </p:txBody>
       </p:sp>
@@ -4090,327 +4128,9 @@
           <a:chExt cx="0" cy="0"/>
         </a:xfrm>
       </p:grpSpPr>
-      <p:sp>
-        <p:nvSpPr>
-          <p:cNvPr id="2" name="Title 1"/>
-          <p:cNvSpPr>
-            <a:spLocks noGrp="1"/>
-          </p:cNvSpPr>
-          <p:nvPr>
-            <p:ph type="title"/>
-          </p:nvPr>
-        </p:nvSpPr>
-        <p:spPr>
-          <a:xfrm>
-            <a:off x="0" y="0"/>
-            <a:ext cx="6832600" cy="1096962"/>
-          </a:xfrm>
-        </p:spPr>
-        <p:txBody>
-          <a:bodyPr>
-            <a:normAutofit/>
-          </a:bodyPr>
-          <a:lstStyle/>
-          <a:p>
-            <a:pPr algn="l"/>
-            <a:r>
-              <a:rPr lang="en-US" dirty="0" smtClean="0"/>
-              <a:t>Who is Data Carpentry </a:t>
-            </a:r>
-            <a:endParaRPr lang="en-US" dirty="0"/>
-          </a:p>
-        </p:txBody>
-      </p:sp>
-      <p:sp>
-        <p:nvSpPr>
-          <p:cNvPr id="7" name="Rectangle 6"/>
-          <p:cNvSpPr/>
-          <p:nvPr/>
-        </p:nvSpPr>
-        <p:spPr>
-          <a:xfrm>
-            <a:off x="203200" y="1017876"/>
-            <a:ext cx="8420100" cy="5078314"/>
-          </a:xfrm>
-          <a:prstGeom prst="rect">
-            <a:avLst/>
-          </a:prstGeom>
-        </p:spPr>
-        <p:txBody>
-          <a:bodyPr wrap="square">
-            <a:spAutoFit/>
-          </a:bodyPr>
-          <a:lstStyle/>
-          <a:p>
-            <a:pPr>
-              <a:buFont typeface="Arial"/>
-              <a:buChar char="•"/>
-            </a:pPr>
-            <a:r>
-              <a:rPr lang="en-US" b="1" dirty="0" smtClean="0"/>
-              <a:t> Project lead: </a:t>
-            </a:r>
-          </a:p>
-          <a:p>
-            <a:pPr lvl="1"/>
-            <a:r>
-              <a:rPr lang="en-US" dirty="0" smtClean="0"/>
-              <a:t>Tracy </a:t>
-            </a:r>
-            <a:r>
-              <a:rPr lang="en-US" dirty="0" smtClean="0"/>
-              <a:t>K. </a:t>
-            </a:r>
-            <a:r>
-              <a:rPr lang="en-US" dirty="0" smtClean="0"/>
-              <a:t>Teal (Michigan </a:t>
-            </a:r>
-            <a:r>
-              <a:rPr lang="en-US" dirty="0" smtClean="0"/>
-              <a:t>State </a:t>
-            </a:r>
-            <a:r>
-              <a:rPr lang="en-US" dirty="0" smtClean="0"/>
-              <a:t>University) </a:t>
-            </a:r>
-          </a:p>
-          <a:p>
-            <a:pPr>
-              <a:buFont typeface="Arial"/>
-              <a:buChar char="•"/>
-            </a:pPr>
-            <a:endParaRPr lang="en-US" dirty="0" smtClean="0"/>
-          </a:p>
-          <a:p>
-            <a:pPr>
-              <a:buFont typeface="Arial"/>
-              <a:buChar char="•"/>
-            </a:pPr>
-            <a:r>
-              <a:rPr lang="en-US" b="1" dirty="0" smtClean="0"/>
-              <a:t> Steering Committee: </a:t>
-            </a:r>
-          </a:p>
-          <a:p>
-            <a:pPr lvl="1"/>
-            <a:r>
-              <a:rPr lang="en-US" dirty="0" smtClean="0"/>
-              <a:t>Karen </a:t>
-            </a:r>
-            <a:r>
-              <a:rPr lang="en-US" dirty="0" smtClean="0"/>
-              <a:t>A. Cranston, Hilmar Lapp</a:t>
-            </a:r>
-            <a:r>
-              <a:rPr lang="en-US" dirty="0" smtClean="0"/>
-              <a:t> </a:t>
-            </a:r>
-            <a:r>
-              <a:rPr lang="en-US" dirty="0" smtClean="0"/>
-              <a:t>(</a:t>
-            </a:r>
-            <a:r>
-              <a:rPr lang="en-US" dirty="0" smtClean="0"/>
-              <a:t>National </a:t>
-            </a:r>
-            <a:r>
-              <a:rPr lang="en-US" dirty="0" smtClean="0"/>
-              <a:t>Evolutionary Synthesis </a:t>
-            </a:r>
-            <a:r>
-              <a:rPr lang="en-US" dirty="0" smtClean="0"/>
-              <a:t>Center, </a:t>
-            </a:r>
-            <a:r>
-              <a:rPr lang="en-US" dirty="0" err="1" smtClean="0"/>
-              <a:t>NESCent</a:t>
-            </a:r>
-            <a:r>
-              <a:rPr lang="en-US" dirty="0" smtClean="0"/>
-              <a:t>) </a:t>
-            </a:r>
-          </a:p>
-          <a:p>
-            <a:pPr lvl="1"/>
-            <a:r>
-              <a:rPr lang="en-US" dirty="0" smtClean="0"/>
-              <a:t>Ethan White (Utah </a:t>
-            </a:r>
-            <a:r>
-              <a:rPr lang="en-US" dirty="0" smtClean="0"/>
-              <a:t>State </a:t>
-            </a:r>
-            <a:r>
-              <a:rPr lang="en-US" dirty="0" smtClean="0"/>
-              <a:t>University) </a:t>
-            </a:r>
-          </a:p>
-          <a:p>
-            <a:pPr lvl="1"/>
-            <a:r>
-              <a:rPr lang="en-US" dirty="0" smtClean="0"/>
-              <a:t>Greg Wilson (Software </a:t>
-            </a:r>
-            <a:r>
-              <a:rPr lang="en-US" dirty="0" smtClean="0"/>
-              <a:t>Carpentry </a:t>
-            </a:r>
-            <a:r>
-              <a:rPr lang="en-US" dirty="0" smtClean="0"/>
-              <a:t>Foundation)</a:t>
-            </a:r>
-          </a:p>
-          <a:p>
-            <a:pPr lvl="1"/>
-            <a:r>
-              <a:rPr lang="en-US" dirty="0" err="1" smtClean="0"/>
-              <a:t>Karthik</a:t>
-            </a:r>
-            <a:r>
-              <a:rPr lang="en-US" dirty="0" smtClean="0"/>
-              <a:t> Ram (University </a:t>
-            </a:r>
-            <a:r>
-              <a:rPr lang="en-US" dirty="0" smtClean="0"/>
-              <a:t>of </a:t>
-            </a:r>
-            <a:r>
-              <a:rPr lang="en-US" dirty="0" smtClean="0"/>
-              <a:t>California)</a:t>
-            </a:r>
-          </a:p>
-          <a:p>
-            <a:pPr lvl="1"/>
-            <a:r>
-              <a:rPr lang="en-US" dirty="0" smtClean="0"/>
-              <a:t>Aleksandra Pawlik (University </a:t>
-            </a:r>
-            <a:r>
-              <a:rPr lang="en-US" dirty="0" smtClean="0"/>
-              <a:t>of </a:t>
-            </a:r>
-            <a:r>
-              <a:rPr lang="en-US" dirty="0" smtClean="0"/>
-              <a:t>Manchester)</a:t>
-            </a:r>
-          </a:p>
-          <a:p>
-            <a:pPr>
-              <a:buFont typeface="Arial"/>
-              <a:buChar char="•"/>
-            </a:pPr>
-            <a:endParaRPr lang="en-US" dirty="0" smtClean="0"/>
-          </a:p>
-          <a:p>
-            <a:pPr>
-              <a:buFont typeface="Arial"/>
-              <a:buChar char="•"/>
-            </a:pPr>
-            <a:r>
-              <a:rPr lang="en-US" b="1" dirty="0" smtClean="0"/>
-              <a:t> Administrators:</a:t>
-            </a:r>
-            <a:r>
-              <a:rPr lang="en-US" dirty="0" smtClean="0"/>
-              <a:t> </a:t>
-            </a:r>
-            <a:r>
-              <a:rPr lang="en-US" dirty="0" err="1" smtClean="0"/>
-              <a:t>Arliss</a:t>
-            </a:r>
-            <a:r>
-              <a:rPr lang="en-US" dirty="0" smtClean="0"/>
-              <a:t> Collins (MSL) and </a:t>
-            </a:r>
-            <a:r>
-              <a:rPr lang="en-US" dirty="0" err="1" smtClean="0"/>
-              <a:t>Giacomo</a:t>
-            </a:r>
-            <a:r>
-              <a:rPr lang="en-US" dirty="0" smtClean="0"/>
-              <a:t> Peru (SSI)</a:t>
-            </a:r>
-          </a:p>
-          <a:p>
-            <a:pPr>
-              <a:buFont typeface="Arial"/>
-              <a:buChar char="•"/>
-            </a:pPr>
-            <a:endParaRPr lang="en-US" dirty="0" smtClean="0"/>
-          </a:p>
-          <a:p>
-            <a:pPr>
-              <a:buFont typeface="Arial"/>
-              <a:buChar char="•"/>
-            </a:pPr>
-            <a:r>
-              <a:rPr lang="en-US" b="1" dirty="0" smtClean="0"/>
-              <a:t> Assessment support: </a:t>
-            </a:r>
-            <a:r>
-              <a:rPr lang="en-US" dirty="0" smtClean="0"/>
-              <a:t>Shari Ellis, </a:t>
-            </a:r>
-            <a:r>
-              <a:rPr lang="en-US" dirty="0" err="1" smtClean="0"/>
-              <a:t>iDigBio</a:t>
-            </a:r>
-            <a:r>
-              <a:rPr lang="en-US" dirty="0" smtClean="0"/>
-              <a:t> </a:t>
-            </a:r>
-          </a:p>
-          <a:p>
-            <a:pPr>
-              <a:buFont typeface="Arial"/>
-              <a:buChar char="•"/>
-            </a:pPr>
-            <a:endParaRPr lang="en-US" dirty="0" smtClean="0"/>
-          </a:p>
-          <a:p>
-            <a:pPr>
-              <a:buFont typeface="Arial"/>
-              <a:buChar char="•"/>
-            </a:pPr>
-            <a:r>
-              <a:rPr lang="en-US" b="1" dirty="0" smtClean="0"/>
-              <a:t> Instructors: </a:t>
-            </a:r>
-            <a:r>
-              <a:rPr lang="en-US" dirty="0" smtClean="0"/>
-              <a:t>international volunteer network</a:t>
-            </a:r>
-          </a:p>
-          <a:p>
-            <a:endParaRPr lang="en-US" b="1" dirty="0" smtClean="0"/>
-          </a:p>
-          <a:p>
-            <a:pPr>
-              <a:buFont typeface="Arial"/>
-              <a:buChar char="•"/>
-            </a:pPr>
-            <a:r>
-              <a:rPr lang="en-US" b="1" dirty="0" smtClean="0"/>
-              <a:t> Funders and partnership </a:t>
-            </a:r>
-            <a:r>
-              <a:rPr lang="en-US" b="1" dirty="0" err="1" smtClean="0"/>
-              <a:t>organisations</a:t>
-            </a:r>
-            <a:r>
-              <a:rPr lang="en-US" dirty="0" smtClean="0"/>
-              <a:t>  </a:t>
-            </a:r>
-            <a:endParaRPr lang="en-US" dirty="0" smtClean="0"/>
-          </a:p>
-          <a:p>
-            <a:endParaRPr lang="en-US" dirty="0"/>
-          </a:p>
-        </p:txBody>
-      </p:sp>
       <p:pic>
         <p:nvPicPr>
-          <p:cNvPr id="5" name="Picture 4"/>
+          <p:cNvPr id="12" name="Picture 11"/>
           <p:cNvPicPr>
             <a:picLocks noChangeAspect="1"/>
           </p:cNvPicPr>
@@ -4424,17 +4144,335 @@
         </p:blipFill>
         <p:spPr>
           <a:xfrm>
-            <a:off x="7717056" y="3784600"/>
-            <a:ext cx="1228798" cy="1149350"/>
+            <a:off x="4648200" y="4933950"/>
+            <a:ext cx="2413000" cy="622357"/>
           </a:xfrm>
           <a:prstGeom prst="rect">
             <a:avLst/>
           </a:prstGeom>
         </p:spPr>
       </p:pic>
+      <p:sp>
+        <p:nvSpPr>
+          <p:cNvPr id="2" name="Title 1"/>
+          <p:cNvSpPr>
+            <a:spLocks noGrp="1"/>
+          </p:cNvSpPr>
+          <p:nvPr>
+            <p:ph type="title"/>
+          </p:nvPr>
+        </p:nvSpPr>
+        <p:spPr>
+          <a:xfrm>
+            <a:off x="0" y="0"/>
+            <a:ext cx="6832600" cy="1096962"/>
+          </a:xfrm>
+        </p:spPr>
+        <p:txBody>
+          <a:bodyPr>
+            <a:normAutofit/>
+          </a:bodyPr>
+          <a:lstStyle/>
+          <a:p>
+            <a:pPr algn="l"/>
+            <a:r>
+              <a:rPr lang="en-US" dirty="0" smtClean="0"/>
+              <a:t>Who is Data Carpentry </a:t>
+            </a:r>
+            <a:endParaRPr lang="en-US" dirty="0"/>
+          </a:p>
+        </p:txBody>
+      </p:sp>
+      <p:sp>
+        <p:nvSpPr>
+          <p:cNvPr id="7" name="Rectangle 6"/>
+          <p:cNvSpPr/>
+          <p:nvPr/>
+        </p:nvSpPr>
+        <p:spPr>
+          <a:xfrm>
+            <a:off x="203200" y="1017876"/>
+            <a:ext cx="8420100" cy="5078314"/>
+          </a:xfrm>
+          <a:prstGeom prst="rect">
+            <a:avLst/>
+          </a:prstGeom>
+        </p:spPr>
+        <p:txBody>
+          <a:bodyPr wrap="square">
+            <a:spAutoFit/>
+          </a:bodyPr>
+          <a:lstStyle/>
+          <a:p>
+            <a:pPr>
+              <a:buFont typeface="Arial"/>
+              <a:buChar char="•"/>
+            </a:pPr>
+            <a:r>
+              <a:rPr lang="en-US" b="1" dirty="0" smtClean="0"/>
+              <a:t> Project lead: </a:t>
+            </a:r>
+          </a:p>
+          <a:p>
+            <a:pPr lvl="1"/>
+            <a:r>
+              <a:rPr lang="en-US" dirty="0" smtClean="0"/>
+              <a:t>Tracy </a:t>
+            </a:r>
+            <a:r>
+              <a:rPr lang="en-US" dirty="0" smtClean="0"/>
+              <a:t>K. </a:t>
+            </a:r>
+            <a:r>
+              <a:rPr lang="en-US" dirty="0" smtClean="0"/>
+              <a:t>Teal (Michigan </a:t>
+            </a:r>
+            <a:r>
+              <a:rPr lang="en-US" dirty="0" smtClean="0"/>
+              <a:t>State </a:t>
+            </a:r>
+            <a:r>
+              <a:rPr lang="en-US" dirty="0" smtClean="0"/>
+              <a:t>University) </a:t>
+            </a:r>
+          </a:p>
+          <a:p>
+            <a:pPr>
+              <a:buFont typeface="Arial"/>
+              <a:buChar char="•"/>
+            </a:pPr>
+            <a:endParaRPr lang="en-US" dirty="0" smtClean="0"/>
+          </a:p>
+          <a:p>
+            <a:pPr>
+              <a:buFont typeface="Arial"/>
+              <a:buChar char="•"/>
+            </a:pPr>
+            <a:r>
+              <a:rPr lang="en-US" b="1" dirty="0" smtClean="0"/>
+              <a:t> Steering Committee: </a:t>
+            </a:r>
+          </a:p>
+          <a:p>
+            <a:pPr lvl="1"/>
+            <a:r>
+              <a:rPr lang="en-US" dirty="0" smtClean="0"/>
+              <a:t>Karen </a:t>
+            </a:r>
+            <a:r>
+              <a:rPr lang="en-US" dirty="0" smtClean="0"/>
+              <a:t>A. Cranston, Hilmar Lapp</a:t>
+            </a:r>
+            <a:r>
+              <a:rPr lang="en-US" dirty="0" smtClean="0"/>
+              <a:t> </a:t>
+            </a:r>
+            <a:r>
+              <a:rPr lang="en-US" dirty="0" smtClean="0"/>
+              <a:t>(</a:t>
+            </a:r>
+            <a:r>
+              <a:rPr lang="en-US" dirty="0" smtClean="0"/>
+              <a:t>National </a:t>
+            </a:r>
+            <a:r>
+              <a:rPr lang="en-US" dirty="0" smtClean="0"/>
+              <a:t>Evolutionary Synthesis </a:t>
+            </a:r>
+            <a:r>
+              <a:rPr lang="en-US" dirty="0" smtClean="0"/>
+              <a:t>Center, </a:t>
+            </a:r>
+            <a:r>
+              <a:rPr lang="en-US" dirty="0" err="1" smtClean="0"/>
+              <a:t>NESCent</a:t>
+            </a:r>
+            <a:r>
+              <a:rPr lang="en-US" dirty="0" smtClean="0"/>
+              <a:t>) </a:t>
+            </a:r>
+          </a:p>
+          <a:p>
+            <a:pPr lvl="1"/>
+            <a:r>
+              <a:rPr lang="en-US" dirty="0" smtClean="0"/>
+              <a:t>Ethan White (Utah </a:t>
+            </a:r>
+            <a:r>
+              <a:rPr lang="en-US" dirty="0" smtClean="0"/>
+              <a:t>State </a:t>
+            </a:r>
+            <a:r>
+              <a:rPr lang="en-US" dirty="0" smtClean="0"/>
+              <a:t>University) </a:t>
+            </a:r>
+          </a:p>
+          <a:p>
+            <a:pPr lvl="1"/>
+            <a:r>
+              <a:rPr lang="en-US" dirty="0" smtClean="0"/>
+              <a:t>Greg Wilson (Software </a:t>
+            </a:r>
+            <a:r>
+              <a:rPr lang="en-US" dirty="0" smtClean="0"/>
+              <a:t>Carpentry </a:t>
+            </a:r>
+            <a:r>
+              <a:rPr lang="en-US" dirty="0" smtClean="0"/>
+              <a:t>Foundation)</a:t>
+            </a:r>
+          </a:p>
+          <a:p>
+            <a:pPr lvl="1"/>
+            <a:r>
+              <a:rPr lang="en-US" dirty="0" err="1" smtClean="0"/>
+              <a:t>Karthik</a:t>
+            </a:r>
+            <a:r>
+              <a:rPr lang="en-US" dirty="0" smtClean="0"/>
+              <a:t> Ram (University </a:t>
+            </a:r>
+            <a:r>
+              <a:rPr lang="en-US" dirty="0" smtClean="0"/>
+              <a:t>of </a:t>
+            </a:r>
+            <a:r>
+              <a:rPr lang="en-US" dirty="0" smtClean="0"/>
+              <a:t>California)</a:t>
+            </a:r>
+          </a:p>
+          <a:p>
+            <a:pPr lvl="1"/>
+            <a:r>
+              <a:rPr lang="en-US" dirty="0" smtClean="0"/>
+              <a:t>Aleksandra Pawlik (University </a:t>
+            </a:r>
+            <a:r>
+              <a:rPr lang="en-US" dirty="0" smtClean="0"/>
+              <a:t>of </a:t>
+            </a:r>
+            <a:r>
+              <a:rPr lang="en-US" dirty="0" smtClean="0"/>
+              <a:t>Manchester)</a:t>
+            </a:r>
+          </a:p>
+          <a:p>
+            <a:pPr>
+              <a:buFont typeface="Arial"/>
+              <a:buChar char="•"/>
+            </a:pPr>
+            <a:endParaRPr lang="en-US" dirty="0" smtClean="0"/>
+          </a:p>
+          <a:p>
+            <a:pPr>
+              <a:buFont typeface="Arial"/>
+              <a:buChar char="•"/>
+            </a:pPr>
+            <a:r>
+              <a:rPr lang="en-US" b="1" dirty="0" smtClean="0"/>
+              <a:t> Administrators:</a:t>
+            </a:r>
+            <a:r>
+              <a:rPr lang="en-US" dirty="0" smtClean="0"/>
+              <a:t> </a:t>
+            </a:r>
+            <a:r>
+              <a:rPr lang="en-US" dirty="0" err="1" smtClean="0"/>
+              <a:t>Arliss</a:t>
+            </a:r>
+            <a:r>
+              <a:rPr lang="en-US" dirty="0" smtClean="0"/>
+              <a:t> Collins (MSL) and </a:t>
+            </a:r>
+            <a:r>
+              <a:rPr lang="en-US" dirty="0" err="1" smtClean="0"/>
+              <a:t>Giacomo</a:t>
+            </a:r>
+            <a:r>
+              <a:rPr lang="en-US" dirty="0" smtClean="0"/>
+              <a:t> Peru (SSI)</a:t>
+            </a:r>
+          </a:p>
+          <a:p>
+            <a:pPr>
+              <a:buFont typeface="Arial"/>
+              <a:buChar char="•"/>
+            </a:pPr>
+            <a:endParaRPr lang="en-US" dirty="0" smtClean="0"/>
+          </a:p>
+          <a:p>
+            <a:pPr>
+              <a:buFont typeface="Arial"/>
+              <a:buChar char="•"/>
+            </a:pPr>
+            <a:r>
+              <a:rPr lang="en-US" b="1" dirty="0" smtClean="0"/>
+              <a:t> Assessment support: </a:t>
+            </a:r>
+            <a:r>
+              <a:rPr lang="en-US" dirty="0" smtClean="0"/>
+              <a:t>Shari Ellis, </a:t>
+            </a:r>
+            <a:r>
+              <a:rPr lang="en-US" dirty="0" err="1" smtClean="0"/>
+              <a:t>iDigBio</a:t>
+            </a:r>
+            <a:r>
+              <a:rPr lang="en-US" dirty="0" smtClean="0"/>
+              <a:t> </a:t>
+            </a:r>
+          </a:p>
+          <a:p>
+            <a:pPr>
+              <a:buFont typeface="Arial"/>
+              <a:buChar char="•"/>
+            </a:pPr>
+            <a:endParaRPr lang="en-US" dirty="0" smtClean="0"/>
+          </a:p>
+          <a:p>
+            <a:pPr>
+              <a:buFont typeface="Arial"/>
+              <a:buChar char="•"/>
+            </a:pPr>
+            <a:r>
+              <a:rPr lang="en-US" b="1" dirty="0" smtClean="0"/>
+              <a:t> Instructors: </a:t>
+            </a:r>
+            <a:r>
+              <a:rPr lang="en-US" dirty="0" smtClean="0"/>
+              <a:t>international volunteer network</a:t>
+            </a:r>
+          </a:p>
+          <a:p>
+            <a:endParaRPr lang="en-US" b="1" dirty="0" smtClean="0"/>
+          </a:p>
+          <a:p>
+            <a:pPr>
+              <a:buFont typeface="Arial"/>
+              <a:buChar char="•"/>
+            </a:pPr>
+            <a:r>
+              <a:rPr lang="en-US" b="1" dirty="0" smtClean="0"/>
+              <a:t> Funders and partnership </a:t>
+            </a:r>
+            <a:r>
+              <a:rPr lang="en-US" b="1" dirty="0" err="1" smtClean="0"/>
+              <a:t>organisations</a:t>
+            </a:r>
+            <a:r>
+              <a:rPr lang="en-US" dirty="0" smtClean="0"/>
+              <a:t>  </a:t>
+            </a:r>
+            <a:endParaRPr lang="en-US" dirty="0" smtClean="0"/>
+          </a:p>
+          <a:p>
+            <a:endParaRPr lang="en-US" dirty="0"/>
+          </a:p>
+        </p:txBody>
+      </p:sp>
       <p:pic>
         <p:nvPicPr>
-          <p:cNvPr id="6" name="Picture 5"/>
+          <p:cNvPr id="5" name="Picture 4"/>
           <p:cNvPicPr>
             <a:picLocks noChangeAspect="1"/>
           </p:cNvPicPr>
@@ -4448,8 +4486,8 @@
         </p:blipFill>
         <p:spPr>
           <a:xfrm>
-            <a:off x="7780556" y="5010150"/>
-            <a:ext cx="1249165" cy="1168400"/>
+            <a:off x="7717056" y="3784600"/>
+            <a:ext cx="1228798" cy="1149350"/>
           </a:xfrm>
           <a:prstGeom prst="rect">
             <a:avLst/>
@@ -4458,7 +4496,7 @@
       </p:pic>
       <p:pic>
         <p:nvPicPr>
-          <p:cNvPr id="8" name="Picture 7"/>
+          <p:cNvPr id="6" name="Picture 5"/>
           <p:cNvPicPr>
             <a:picLocks noChangeAspect="1"/>
           </p:cNvPicPr>
@@ -4472,7 +4510,31 @@
         </p:blipFill>
         <p:spPr>
           <a:xfrm>
-            <a:off x="5854700" y="5843051"/>
+            <a:off x="7780556" y="5010150"/>
+            <a:ext cx="1249165" cy="1168400"/>
+          </a:xfrm>
+          <a:prstGeom prst="rect">
+            <a:avLst/>
+          </a:prstGeom>
+        </p:spPr>
+      </p:pic>
+      <p:pic>
+        <p:nvPicPr>
+          <p:cNvPr id="8" name="Picture 7"/>
+          <p:cNvPicPr>
+            <a:picLocks noChangeAspect="1"/>
+          </p:cNvPicPr>
+          <p:nvPr/>
+        </p:nvPicPr>
+        <p:blipFill>
+          <a:blip r:embed="rId5"/>
+          <a:stretch>
+            <a:fillRect/>
+          </a:stretch>
+        </p:blipFill>
+        <p:spPr>
+          <a:xfrm>
+            <a:off x="5286773" y="5556307"/>
             <a:ext cx="1663700" cy="429698"/>
           </a:xfrm>
           <a:prstGeom prst="rect">
@@ -4489,7 +4551,7 @@
           <p:nvPr/>
         </p:nvPicPr>
         <p:blipFill>
-          <a:blip r:embed="rId5">
+          <a:blip r:embed="rId6">
             <a:extLst>
               <a:ext uri="{28A0092B-C50C-407E-A947-70E740481C1C}">
                 <a14:useLocalDpi xmlns:a14="http://schemas.microsoft.com/office/drawing/2010/main" xmlns:p="http://schemas.openxmlformats.org/presentationml/2006/main" xmlns:r="http://schemas.openxmlformats.org/officeDocument/2006/relationships" xmlns:a="http://schemas.openxmlformats.org/drawingml/2006/main" xmlns="" val="0"/>
@@ -4513,30 +4575,6 @@
       <p:pic>
         <p:nvPicPr>
           <p:cNvPr id="10" name="Picture 9"/>
-          <p:cNvPicPr>
-            <a:picLocks noChangeAspect="1"/>
-          </p:cNvPicPr>
-          <p:nvPr/>
-        </p:nvPicPr>
-        <p:blipFill>
-          <a:blip r:embed="rId6"/>
-          <a:stretch>
-            <a:fillRect/>
-          </a:stretch>
-        </p:blipFill>
-        <p:spPr>
-          <a:xfrm>
-            <a:off x="4114610" y="5638800"/>
-            <a:ext cx="1098740" cy="1098740"/>
-          </a:xfrm>
-          <a:prstGeom prst="rect">
-            <a:avLst/>
-          </a:prstGeom>
-        </p:spPr>
-      </p:pic>
-      <p:pic>
-        <p:nvPicPr>
-          <p:cNvPr id="11" name="Picture 10"/>
           <p:cNvPicPr>
             <a:picLocks noChangeAspect="1"/>
           </p:cNvPicPr>
@@ -4550,8 +4588,8 @@
         </p:blipFill>
         <p:spPr>
           <a:xfrm>
-            <a:off x="6686550" y="2886308"/>
-            <a:ext cx="2279671" cy="664675"/>
+            <a:off x="4114610" y="5638800"/>
+            <a:ext cx="1098740" cy="1098740"/>
           </a:xfrm>
           <a:prstGeom prst="rect">
             <a:avLst/>
@@ -4560,7 +4598,7 @@
       </p:pic>
       <p:pic>
         <p:nvPicPr>
-          <p:cNvPr id="12" name="Picture 11"/>
+          <p:cNvPr id="11" name="Picture 10"/>
           <p:cNvPicPr>
             <a:picLocks noChangeAspect="1"/>
           </p:cNvPicPr>
@@ -4574,8 +4612,8 @@
         </p:blipFill>
         <p:spPr>
           <a:xfrm>
-            <a:off x="4648200" y="5022850"/>
-            <a:ext cx="2413000" cy="622357"/>
+            <a:off x="6686550" y="2886308"/>
+            <a:ext cx="2279671" cy="664675"/>
           </a:xfrm>
           <a:prstGeom prst="rect">
             <a:avLst/>
@@ -4624,6 +4662,30 @@
           <a:xfrm>
             <a:off x="4947447" y="4269980"/>
             <a:ext cx="1739103" cy="635801"/>
+          </a:xfrm>
+          <a:prstGeom prst="rect">
+            <a:avLst/>
+          </a:prstGeom>
+        </p:spPr>
+      </p:pic>
+      <p:pic>
+        <p:nvPicPr>
+          <p:cNvPr id="15" name="Picture 14"/>
+          <p:cNvPicPr>
+            <a:picLocks noChangeAspect="1"/>
+          </p:cNvPicPr>
+          <p:nvPr/>
+        </p:nvPicPr>
+        <p:blipFill>
+          <a:blip r:embed="rId11"/>
+          <a:stretch>
+            <a:fillRect/>
+          </a:stretch>
+        </p:blipFill>
+        <p:spPr>
+          <a:xfrm>
+            <a:off x="6052537" y="6027476"/>
+            <a:ext cx="1885153" cy="746648"/>
           </a:xfrm>
           <a:prstGeom prst="rect">
             <a:avLst/>
@@ -6237,8 +6299,8 @@
         </p:blipFill>
         <p:spPr>
           <a:xfrm rot="1106318">
-            <a:off x="3848100" y="964185"/>
-            <a:ext cx="2495550" cy="1652327"/>
+            <a:off x="3888276" y="716654"/>
+            <a:ext cx="3003859" cy="1988883"/>
           </a:xfrm>
           <a:prstGeom prst="rect">
             <a:avLst/>
@@ -6260,9 +6322,9 @@
           </a:stretch>
         </p:blipFill>
         <p:spPr>
-          <a:xfrm>
-            <a:off x="4114636" y="2465255"/>
-            <a:ext cx="2226954" cy="1241788"/>
+          <a:xfrm rot="20924824">
+            <a:off x="4698559" y="2378346"/>
+            <a:ext cx="3071296" cy="1712608"/>
           </a:xfrm>
           <a:prstGeom prst="rect">
             <a:avLst/>
@@ -6284,9 +6346,9 @@
           </a:stretch>
         </p:blipFill>
         <p:spPr>
-          <a:xfrm rot="10800000">
-            <a:off x="4216800" y="3967033"/>
-            <a:ext cx="2615800" cy="1864779"/>
+          <a:xfrm rot="12192308">
+            <a:off x="4290337" y="3646967"/>
+            <a:ext cx="3351191" cy="2389032"/>
           </a:xfrm>
           <a:prstGeom prst="rect">
             <a:avLst/>

</xml_diff>

<commit_message>
NumFocus logo in place of NSF
</commit_message>
<xml_diff>
--- a/IDCC2015_Data_Carpentry.pptx
+++ b/IDCC2015_Data_Carpentry.pptx
@@ -4191,8 +4191,8 @@
         </p:nvSpPr>
         <p:spPr>
           <a:xfrm>
-            <a:off x="203200" y="1017876"/>
-            <a:ext cx="8420100" cy="5078314"/>
+            <a:off x="203200" y="916276"/>
+            <a:ext cx="8420100" cy="5355313"/>
           </a:xfrm>
           <a:prstGeom prst="rect">
             <a:avLst/>
@@ -4261,7 +4261,38 @@
             </a:r>
             <a:r>
               <a:rPr lang="en-US" dirty="0" smtClean="0"/>
-              <a:t>A. Cranston, Hilmar Lapp</a:t>
+              <a:t>A. </a:t>
+            </a:r>
+            <a:r>
+              <a:rPr lang="en-US" dirty="0" smtClean="0"/>
+              <a:t>Cranston </a:t>
+            </a:r>
+            <a:r>
+              <a:rPr lang="en-US" dirty="0" smtClean="0"/>
+              <a:t>(National Evolutionary Synthesis Center, </a:t>
+            </a:r>
+            <a:r>
+              <a:rPr lang="en-US" dirty="0" err="1" smtClean="0"/>
+              <a:t>NESCent</a:t>
+            </a:r>
+            <a:r>
+              <a:rPr lang="en-US" dirty="0" smtClean="0"/>
+              <a:t>) </a:t>
+            </a:r>
+            <a:r>
+              <a:rPr lang="en-US" dirty="0" smtClean="0"/>
+              <a:t> </a:t>
+            </a:r>
+          </a:p>
+          <a:p>
+            <a:pPr lvl="1"/>
+            <a:r>
+              <a:rPr lang="en-US" dirty="0" smtClean="0"/>
+              <a:t>Hilmar </a:t>
+            </a:r>
+            <a:r>
+              <a:rPr lang="en-US" dirty="0" smtClean="0"/>
+              <a:t>Lapp</a:t>
             </a:r>
             <a:r>
               <a:rPr lang="en-US" dirty="0" smtClean="0"/>
@@ -4574,7 +4605,7 @@
       </p:pic>
       <p:pic>
         <p:nvPicPr>
-          <p:cNvPr id="10" name="Picture 9"/>
+          <p:cNvPr id="11" name="Picture 10"/>
           <p:cNvPicPr>
             <a:picLocks noChangeAspect="1"/>
           </p:cNvPicPr>
@@ -4588,8 +4619,8 @@
         </p:blipFill>
         <p:spPr>
           <a:xfrm>
-            <a:off x="4114610" y="5638800"/>
-            <a:ext cx="1098740" cy="1098740"/>
+            <a:off x="6686550" y="2886308"/>
+            <a:ext cx="2279671" cy="664675"/>
           </a:xfrm>
           <a:prstGeom prst="rect">
             <a:avLst/>
@@ -4598,7 +4629,7 @@
       </p:pic>
       <p:pic>
         <p:nvPicPr>
-          <p:cNvPr id="11" name="Picture 10"/>
+          <p:cNvPr id="13" name="Picture 12"/>
           <p:cNvPicPr>
             <a:picLocks noChangeAspect="1"/>
           </p:cNvPicPr>
@@ -4612,8 +4643,8 @@
         </p:blipFill>
         <p:spPr>
           <a:xfrm>
-            <a:off x="6686550" y="2886308"/>
-            <a:ext cx="2279671" cy="664675"/>
+            <a:off x="6197600" y="3656799"/>
+            <a:ext cx="1740090" cy="536981"/>
           </a:xfrm>
           <a:prstGeom prst="rect">
             <a:avLst/>
@@ -4622,7 +4653,7 @@
       </p:pic>
       <p:pic>
         <p:nvPicPr>
-          <p:cNvPr id="13" name="Picture 12"/>
+          <p:cNvPr id="14" name="Picture 13"/>
           <p:cNvPicPr>
             <a:picLocks noChangeAspect="1"/>
           </p:cNvPicPr>
@@ -4636,8 +4667,8 @@
         </p:blipFill>
         <p:spPr>
           <a:xfrm>
-            <a:off x="6197600" y="3656799"/>
-            <a:ext cx="1740090" cy="536981"/>
+            <a:off x="4947447" y="4269980"/>
+            <a:ext cx="1739103" cy="635801"/>
           </a:xfrm>
           <a:prstGeom prst="rect">
             <a:avLst/>
@@ -4646,7 +4677,7 @@
       </p:pic>
       <p:pic>
         <p:nvPicPr>
-          <p:cNvPr id="14" name="Picture 13"/>
+          <p:cNvPr id="15" name="Picture 14"/>
           <p:cNvPicPr>
             <a:picLocks noChangeAspect="1"/>
           </p:cNvPicPr>
@@ -4660,8 +4691,8 @@
         </p:blipFill>
         <p:spPr>
           <a:xfrm>
-            <a:off x="4947447" y="4269980"/>
-            <a:ext cx="1739103" cy="635801"/>
+            <a:off x="6052537" y="6027476"/>
+            <a:ext cx="1885153" cy="746648"/>
           </a:xfrm>
           <a:prstGeom prst="rect">
             <a:avLst/>
@@ -4670,7 +4701,7 @@
       </p:pic>
       <p:pic>
         <p:nvPicPr>
-          <p:cNvPr id="15" name="Picture 14"/>
+          <p:cNvPr id="16" name="Picture 15"/>
           <p:cNvPicPr>
             <a:picLocks noChangeAspect="1"/>
           </p:cNvPicPr>
@@ -4684,8 +4715,8 @@
         </p:blipFill>
         <p:spPr>
           <a:xfrm>
-            <a:off x="6052537" y="6027476"/>
-            <a:ext cx="1885153" cy="746648"/>
+            <a:off x="4648200" y="6075576"/>
+            <a:ext cx="1244600" cy="616316"/>
           </a:xfrm>
           <a:prstGeom prst="rect">
             <a:avLst/>

</xml_diff>